<commit_message>
workign with updated drivetrain
</commit_message>
<xml_diff>
--- a/misc/2021_grids.pptx
+++ b/misc/2021_grids.pptx
@@ -8,6 +8,7 @@
     <p:sldId id="256" r:id="rId2"/>
     <p:sldId id="257" r:id="rId3"/>
     <p:sldId id="258" r:id="rId4"/>
+    <p:sldId id="259" r:id="rId5"/>
   </p:sldIdLst>
   <p:sldSz cx="9144000" cy="6858000" type="screen4x3"/>
   <p:notesSz cx="6858000" cy="9144000"/>
@@ -106,6 +107,11 @@
       </a:defRPr>
     </a:lvl9pPr>
   </p:defaultTextStyle>
+  <p:extLst>
+    <p:ext uri="{EFAFB233-063F-42B5-8137-9DF3F51BA10A}">
+      <p15:sldGuideLst xmlns:p15="http://schemas.microsoft.com/office/powerpoint/2012/main"/>
+    </p:ext>
+  </p:extLst>
 </p:presentation>
 </file>
 
@@ -240,7 +246,7 @@
           <a:p>
             <a:fld id="{FB18013C-0488-41A0-AC40-02F47DCD4E43}" type="datetimeFigureOut">
               <a:rPr lang="en-US" smtClean="0"/>
-              <a:t>2/5/2021</a:t>
+              <a:t>2/7/2021</a:t>
             </a:fld>
             <a:endParaRPr lang="en-US"/>
           </a:p>
@@ -410,7 +416,7 @@
           <a:p>
             <a:fld id="{FB18013C-0488-41A0-AC40-02F47DCD4E43}" type="datetimeFigureOut">
               <a:rPr lang="en-US" smtClean="0"/>
-              <a:t>2/5/2021</a:t>
+              <a:t>2/7/2021</a:t>
             </a:fld>
             <a:endParaRPr lang="en-US"/>
           </a:p>
@@ -590,7 +596,7 @@
           <a:p>
             <a:fld id="{FB18013C-0488-41A0-AC40-02F47DCD4E43}" type="datetimeFigureOut">
               <a:rPr lang="en-US" smtClean="0"/>
-              <a:t>2/5/2021</a:t>
+              <a:t>2/7/2021</a:t>
             </a:fld>
             <a:endParaRPr lang="en-US"/>
           </a:p>
@@ -760,7 +766,7 @@
           <a:p>
             <a:fld id="{FB18013C-0488-41A0-AC40-02F47DCD4E43}" type="datetimeFigureOut">
               <a:rPr lang="en-US" smtClean="0"/>
-              <a:t>2/5/2021</a:t>
+              <a:t>2/7/2021</a:t>
             </a:fld>
             <a:endParaRPr lang="en-US"/>
           </a:p>
@@ -1004,7 +1010,7 @@
           <a:p>
             <a:fld id="{FB18013C-0488-41A0-AC40-02F47DCD4E43}" type="datetimeFigureOut">
               <a:rPr lang="en-US" smtClean="0"/>
-              <a:t>2/5/2021</a:t>
+              <a:t>2/7/2021</a:t>
             </a:fld>
             <a:endParaRPr lang="en-US"/>
           </a:p>
@@ -1236,7 +1242,7 @@
           <a:p>
             <a:fld id="{FB18013C-0488-41A0-AC40-02F47DCD4E43}" type="datetimeFigureOut">
               <a:rPr lang="en-US" smtClean="0"/>
-              <a:t>2/5/2021</a:t>
+              <a:t>2/7/2021</a:t>
             </a:fld>
             <a:endParaRPr lang="en-US"/>
           </a:p>
@@ -1603,7 +1609,7 @@
           <a:p>
             <a:fld id="{FB18013C-0488-41A0-AC40-02F47DCD4E43}" type="datetimeFigureOut">
               <a:rPr lang="en-US" smtClean="0"/>
-              <a:t>2/5/2021</a:t>
+              <a:t>2/7/2021</a:t>
             </a:fld>
             <a:endParaRPr lang="en-US"/>
           </a:p>
@@ -1721,7 +1727,7 @@
           <a:p>
             <a:fld id="{FB18013C-0488-41A0-AC40-02F47DCD4E43}" type="datetimeFigureOut">
               <a:rPr lang="en-US" smtClean="0"/>
-              <a:t>2/5/2021</a:t>
+              <a:t>2/7/2021</a:t>
             </a:fld>
             <a:endParaRPr lang="en-US"/>
           </a:p>
@@ -1816,7 +1822,7 @@
           <a:p>
             <a:fld id="{FB18013C-0488-41A0-AC40-02F47DCD4E43}" type="datetimeFigureOut">
               <a:rPr lang="en-US" smtClean="0"/>
-              <a:t>2/5/2021</a:t>
+              <a:t>2/7/2021</a:t>
             </a:fld>
             <a:endParaRPr lang="en-US"/>
           </a:p>
@@ -2093,7 +2099,7 @@
           <a:p>
             <a:fld id="{FB18013C-0488-41A0-AC40-02F47DCD4E43}" type="datetimeFigureOut">
               <a:rPr lang="en-US" smtClean="0"/>
-              <a:t>2/5/2021</a:t>
+              <a:t>2/7/2021</a:t>
             </a:fld>
             <a:endParaRPr lang="en-US"/>
           </a:p>
@@ -2350,7 +2356,7 @@
           <a:p>
             <a:fld id="{FB18013C-0488-41A0-AC40-02F47DCD4E43}" type="datetimeFigureOut">
               <a:rPr lang="en-US" smtClean="0"/>
-              <a:t>2/5/2021</a:t>
+              <a:t>2/7/2021</a:t>
             </a:fld>
             <a:endParaRPr lang="en-US"/>
           </a:p>
@@ -2563,7 +2569,7 @@
           <a:p>
             <a:fld id="{FB18013C-0488-41A0-AC40-02F47DCD4E43}" type="datetimeFigureOut">
               <a:rPr lang="en-US" smtClean="0"/>
-              <a:t>2/5/2021</a:t>
+              <a:t>2/7/2021</a:t>
             </a:fld>
             <a:endParaRPr lang="en-US"/>
           </a:p>
@@ -4322,6 +4328,535 @@
 </p:sld>
 </file>
 
+<file path=ppt/slides/slide4.xml><?xml version="1.0" encoding="utf-8"?>
+<p:sld xmlns:a="http://schemas.openxmlformats.org/drawingml/2006/main" xmlns:r="http://schemas.openxmlformats.org/officeDocument/2006/relationships" xmlns:p="http://schemas.openxmlformats.org/presentationml/2006/main">
+  <p:cSld>
+    <p:spTree>
+      <p:nvGrpSpPr>
+        <p:cNvPr id="1" name=""/>
+        <p:cNvGrpSpPr/>
+        <p:nvPr/>
+      </p:nvGrpSpPr>
+      <p:grpSpPr>
+        <a:xfrm>
+          <a:off x="0" y="0"/>
+          <a:ext cx="0" cy="0"/>
+          <a:chOff x="0" y="0"/>
+          <a:chExt cx="0" cy="0"/>
+        </a:xfrm>
+      </p:grpSpPr>
+      <p:pic>
+        <p:nvPicPr>
+          <p:cNvPr id="5" name="Picture 4">
+            <a:extLst>
+              <a:ext uri="{FF2B5EF4-FFF2-40B4-BE49-F238E27FC236}">
+                <a16:creationId xmlns:a16="http://schemas.microsoft.com/office/drawing/2014/main" id="{56D258C5-A427-487C-8D78-838A8FE1DEEB}"/>
+              </a:ext>
+            </a:extLst>
+          </p:cNvPr>
+          <p:cNvPicPr>
+            <a:picLocks noChangeAspect="1"/>
+          </p:cNvPicPr>
+          <p:nvPr/>
+        </p:nvPicPr>
+        <p:blipFill>
+          <a:blip r:embed="rId2">
+            <a:extLst>
+              <a:ext uri="{28A0092B-C50C-407E-A947-70E740481C1C}">
+                <a14:useLocalDpi xmlns:a14="http://schemas.microsoft.com/office/drawing/2010/main" val="0"/>
+              </a:ext>
+            </a:extLst>
+          </a:blip>
+          <a:stretch>
+            <a:fillRect/>
+          </a:stretch>
+        </p:blipFill>
+        <p:spPr>
+          <a:xfrm>
+            <a:off x="760459" y="1427941"/>
+            <a:ext cx="7623081" cy="4002118"/>
+          </a:xfrm>
+          <a:prstGeom prst="rect">
+            <a:avLst/>
+          </a:prstGeom>
+        </p:spPr>
+      </p:pic>
+      <p:grpSp>
+        <p:nvGrpSpPr>
+          <p:cNvPr id="30" name="Group 29">
+            <a:extLst>
+              <a:ext uri="{FF2B5EF4-FFF2-40B4-BE49-F238E27FC236}">
+                <a16:creationId xmlns:a16="http://schemas.microsoft.com/office/drawing/2014/main" id="{5A838475-A557-482C-9252-4536E52C4123}"/>
+              </a:ext>
+            </a:extLst>
+          </p:cNvPr>
+          <p:cNvGrpSpPr/>
+          <p:nvPr/>
+        </p:nvGrpSpPr>
+        <p:grpSpPr>
+          <a:xfrm>
+            <a:off x="960195" y="1615601"/>
+            <a:ext cx="7229744" cy="3621491"/>
+            <a:chOff x="960195" y="1615601"/>
+            <a:chExt cx="7229744" cy="3621491"/>
+          </a:xfrm>
+        </p:grpSpPr>
+        <p:cxnSp>
+          <p:nvCxnSpPr>
+            <p:cNvPr id="31" name="Straight Connector 30">
+              <a:extLst>
+                <a:ext uri="{FF2B5EF4-FFF2-40B4-BE49-F238E27FC236}">
+                  <a16:creationId xmlns:a16="http://schemas.microsoft.com/office/drawing/2014/main" id="{672DD5A0-E5DA-4712-B84A-A8139456EE4E}"/>
+                </a:ext>
+              </a:extLst>
+            </p:cNvPr>
+            <p:cNvCxnSpPr/>
+            <p:nvPr/>
+          </p:nvCxnSpPr>
+          <p:spPr>
+            <a:xfrm>
+              <a:off x="961970" y="2811913"/>
+              <a:ext cx="7204203" cy="0"/>
+            </a:xfrm>
+            <a:prstGeom prst="line">
+              <a:avLst/>
+            </a:prstGeom>
+          </p:spPr>
+          <p:style>
+            <a:lnRef idx="1">
+              <a:schemeClr val="accent1"/>
+            </a:lnRef>
+            <a:fillRef idx="0">
+              <a:schemeClr val="accent1"/>
+            </a:fillRef>
+            <a:effectRef idx="0">
+              <a:schemeClr val="accent1"/>
+            </a:effectRef>
+            <a:fontRef idx="minor">
+              <a:schemeClr val="tx1"/>
+            </a:fontRef>
+          </p:style>
+        </p:cxnSp>
+        <p:cxnSp>
+          <p:nvCxnSpPr>
+            <p:cNvPr id="32" name="Straight Connector 31">
+              <a:extLst>
+                <a:ext uri="{FF2B5EF4-FFF2-40B4-BE49-F238E27FC236}">
+                  <a16:creationId xmlns:a16="http://schemas.microsoft.com/office/drawing/2014/main" id="{32105DDB-5981-4032-A2FB-F87208182591}"/>
+                </a:ext>
+              </a:extLst>
+            </p:cNvPr>
+            <p:cNvCxnSpPr/>
+            <p:nvPr/>
+          </p:nvCxnSpPr>
+          <p:spPr>
+            <a:xfrm>
+              <a:off x="971653" y="4037266"/>
+              <a:ext cx="7204203" cy="0"/>
+            </a:xfrm>
+            <a:prstGeom prst="line">
+              <a:avLst/>
+            </a:prstGeom>
+          </p:spPr>
+          <p:style>
+            <a:lnRef idx="1">
+              <a:schemeClr val="accent1"/>
+            </a:lnRef>
+            <a:fillRef idx="0">
+              <a:schemeClr val="accent1"/>
+            </a:fillRef>
+            <a:effectRef idx="0">
+              <a:schemeClr val="accent1"/>
+            </a:effectRef>
+            <a:fontRef idx="minor">
+              <a:schemeClr val="tx1"/>
+            </a:fontRef>
+          </p:style>
+        </p:cxnSp>
+        <p:cxnSp>
+          <p:nvCxnSpPr>
+            <p:cNvPr id="33" name="Straight Connector 32">
+              <a:extLst>
+                <a:ext uri="{FF2B5EF4-FFF2-40B4-BE49-F238E27FC236}">
+                  <a16:creationId xmlns:a16="http://schemas.microsoft.com/office/drawing/2014/main" id="{7DBFC6EB-EDC6-43EF-B7A6-BEA6CF4CC6F9}"/>
+                </a:ext>
+              </a:extLst>
+            </p:cNvPr>
+            <p:cNvCxnSpPr/>
+            <p:nvPr/>
+          </p:nvCxnSpPr>
+          <p:spPr>
+            <a:xfrm>
+              <a:off x="960195" y="4633660"/>
+              <a:ext cx="7204203" cy="0"/>
+            </a:xfrm>
+            <a:prstGeom prst="line">
+              <a:avLst/>
+            </a:prstGeom>
+          </p:spPr>
+          <p:style>
+            <a:lnRef idx="1">
+              <a:schemeClr val="accent1"/>
+            </a:lnRef>
+            <a:fillRef idx="0">
+              <a:schemeClr val="accent1"/>
+            </a:fillRef>
+            <a:effectRef idx="0">
+              <a:schemeClr val="accent1"/>
+            </a:effectRef>
+            <a:fontRef idx="minor">
+              <a:schemeClr val="tx1"/>
+            </a:fontRef>
+          </p:style>
+        </p:cxnSp>
+        <p:cxnSp>
+          <p:nvCxnSpPr>
+            <p:cNvPr id="34" name="Straight Connector 33">
+              <a:extLst>
+                <a:ext uri="{FF2B5EF4-FFF2-40B4-BE49-F238E27FC236}">
+                  <a16:creationId xmlns:a16="http://schemas.microsoft.com/office/drawing/2014/main" id="{BE0C9F32-D411-4B22-A96F-0E136ADC460B}"/>
+                </a:ext>
+              </a:extLst>
+            </p:cNvPr>
+            <p:cNvCxnSpPr/>
+            <p:nvPr/>
+          </p:nvCxnSpPr>
+          <p:spPr>
+            <a:xfrm>
+              <a:off x="985736" y="3406544"/>
+              <a:ext cx="7204203" cy="0"/>
+            </a:xfrm>
+            <a:prstGeom prst="line">
+              <a:avLst/>
+            </a:prstGeom>
+          </p:spPr>
+          <p:style>
+            <a:lnRef idx="1">
+              <a:schemeClr val="accent1"/>
+            </a:lnRef>
+            <a:fillRef idx="0">
+              <a:schemeClr val="accent1"/>
+            </a:fillRef>
+            <a:effectRef idx="0">
+              <a:schemeClr val="accent1"/>
+            </a:effectRef>
+            <a:fontRef idx="minor">
+              <a:schemeClr val="tx1"/>
+            </a:fontRef>
+          </p:style>
+        </p:cxnSp>
+        <p:cxnSp>
+          <p:nvCxnSpPr>
+            <p:cNvPr id="35" name="Straight Connector 34">
+              <a:extLst>
+                <a:ext uri="{FF2B5EF4-FFF2-40B4-BE49-F238E27FC236}">
+                  <a16:creationId xmlns:a16="http://schemas.microsoft.com/office/drawing/2014/main" id="{E7752E1E-E319-4107-8723-E0E3C16A2DB2}"/>
+                </a:ext>
+              </a:extLst>
+            </p:cNvPr>
+            <p:cNvCxnSpPr/>
+            <p:nvPr/>
+          </p:nvCxnSpPr>
+          <p:spPr>
+            <a:xfrm>
+              <a:off x="963706" y="2216415"/>
+              <a:ext cx="7204203" cy="0"/>
+            </a:xfrm>
+            <a:prstGeom prst="line">
+              <a:avLst/>
+            </a:prstGeom>
+          </p:spPr>
+          <p:style>
+            <a:lnRef idx="1">
+              <a:schemeClr val="accent1"/>
+            </a:lnRef>
+            <a:fillRef idx="0">
+              <a:schemeClr val="accent1"/>
+            </a:fillRef>
+            <a:effectRef idx="0">
+              <a:schemeClr val="accent1"/>
+            </a:effectRef>
+            <a:fontRef idx="minor">
+              <a:schemeClr val="tx1"/>
+            </a:fontRef>
+          </p:style>
+        </p:cxnSp>
+        <p:cxnSp>
+          <p:nvCxnSpPr>
+            <p:cNvPr id="36" name="Straight Connector 35">
+              <a:extLst>
+                <a:ext uri="{FF2B5EF4-FFF2-40B4-BE49-F238E27FC236}">
+                  <a16:creationId xmlns:a16="http://schemas.microsoft.com/office/drawing/2014/main" id="{40D5827F-0737-4A0A-BD42-396C5AE9DA7A}"/>
+                </a:ext>
+              </a:extLst>
+            </p:cNvPr>
+            <p:cNvCxnSpPr>
+              <a:cxnSpLocks/>
+            </p:cNvCxnSpPr>
+            <p:nvPr/>
+          </p:nvCxnSpPr>
+          <p:spPr>
+            <a:xfrm>
+              <a:off x="6990127" y="1617379"/>
+              <a:ext cx="0" cy="3610030"/>
+            </a:xfrm>
+            <a:prstGeom prst="line">
+              <a:avLst/>
+            </a:prstGeom>
+          </p:spPr>
+          <p:style>
+            <a:lnRef idx="1">
+              <a:schemeClr val="accent1"/>
+            </a:lnRef>
+            <a:fillRef idx="0">
+              <a:schemeClr val="accent1"/>
+            </a:fillRef>
+            <a:effectRef idx="0">
+              <a:schemeClr val="accent1"/>
+            </a:effectRef>
+            <a:fontRef idx="minor">
+              <a:schemeClr val="tx1"/>
+            </a:fontRef>
+          </p:style>
+        </p:cxnSp>
+        <p:cxnSp>
+          <p:nvCxnSpPr>
+            <p:cNvPr id="37" name="Straight Connector 36">
+              <a:extLst>
+                <a:ext uri="{FF2B5EF4-FFF2-40B4-BE49-F238E27FC236}">
+                  <a16:creationId xmlns:a16="http://schemas.microsoft.com/office/drawing/2014/main" id="{6FCEC48A-8143-48B7-945F-89AEA60307FA}"/>
+                </a:ext>
+              </a:extLst>
+            </p:cNvPr>
+            <p:cNvCxnSpPr>
+              <a:cxnSpLocks/>
+            </p:cNvCxnSpPr>
+            <p:nvPr/>
+          </p:nvCxnSpPr>
+          <p:spPr>
+            <a:xfrm>
+              <a:off x="5778864" y="1627062"/>
+              <a:ext cx="0" cy="3610030"/>
+            </a:xfrm>
+            <a:prstGeom prst="line">
+              <a:avLst/>
+            </a:prstGeom>
+          </p:spPr>
+          <p:style>
+            <a:lnRef idx="1">
+              <a:schemeClr val="accent1"/>
+            </a:lnRef>
+            <a:fillRef idx="0">
+              <a:schemeClr val="accent1"/>
+            </a:fillRef>
+            <a:effectRef idx="0">
+              <a:schemeClr val="accent1"/>
+            </a:effectRef>
+            <a:fontRef idx="minor">
+              <a:schemeClr val="tx1"/>
+            </a:fontRef>
+          </p:style>
+        </p:cxnSp>
+        <p:cxnSp>
+          <p:nvCxnSpPr>
+            <p:cNvPr id="38" name="Straight Connector 37">
+              <a:extLst>
+                <a:ext uri="{FF2B5EF4-FFF2-40B4-BE49-F238E27FC236}">
+                  <a16:creationId xmlns:a16="http://schemas.microsoft.com/office/drawing/2014/main" id="{46C3A143-4AF2-4CBC-A64A-ECADB09D14E5}"/>
+                </a:ext>
+              </a:extLst>
+            </p:cNvPr>
+            <p:cNvCxnSpPr>
+              <a:cxnSpLocks/>
+            </p:cNvCxnSpPr>
+            <p:nvPr/>
+          </p:nvCxnSpPr>
+          <p:spPr>
+            <a:xfrm>
+              <a:off x="4578168" y="1615601"/>
+              <a:ext cx="0" cy="3610030"/>
+            </a:xfrm>
+            <a:prstGeom prst="line">
+              <a:avLst/>
+            </a:prstGeom>
+          </p:spPr>
+          <p:style>
+            <a:lnRef idx="1">
+              <a:schemeClr val="accent1"/>
+            </a:lnRef>
+            <a:fillRef idx="0">
+              <a:schemeClr val="accent1"/>
+            </a:fillRef>
+            <a:effectRef idx="0">
+              <a:schemeClr val="accent1"/>
+            </a:effectRef>
+            <a:fontRef idx="minor">
+              <a:schemeClr val="tx1"/>
+            </a:fontRef>
+          </p:style>
+        </p:cxnSp>
+        <p:cxnSp>
+          <p:nvCxnSpPr>
+            <p:cNvPr id="39" name="Straight Connector 38">
+              <a:extLst>
+                <a:ext uri="{FF2B5EF4-FFF2-40B4-BE49-F238E27FC236}">
+                  <a16:creationId xmlns:a16="http://schemas.microsoft.com/office/drawing/2014/main" id="{D060007E-00CE-4881-B84A-22C4E080D1AE}"/>
+                </a:ext>
+              </a:extLst>
+            </p:cNvPr>
+            <p:cNvCxnSpPr>
+              <a:cxnSpLocks/>
+            </p:cNvCxnSpPr>
+            <p:nvPr/>
+          </p:nvCxnSpPr>
+          <p:spPr>
+            <a:xfrm>
+              <a:off x="3372181" y="1625289"/>
+              <a:ext cx="0" cy="3610030"/>
+            </a:xfrm>
+            <a:prstGeom prst="line">
+              <a:avLst/>
+            </a:prstGeom>
+          </p:spPr>
+          <p:style>
+            <a:lnRef idx="1">
+              <a:schemeClr val="accent1"/>
+            </a:lnRef>
+            <a:fillRef idx="0">
+              <a:schemeClr val="accent1"/>
+            </a:fillRef>
+            <a:effectRef idx="0">
+              <a:schemeClr val="accent1"/>
+            </a:effectRef>
+            <a:fontRef idx="minor">
+              <a:schemeClr val="tx1"/>
+            </a:fontRef>
+          </p:style>
+        </p:cxnSp>
+        <p:cxnSp>
+          <p:nvCxnSpPr>
+            <p:cNvPr id="40" name="Straight Connector 39">
+              <a:extLst>
+                <a:ext uri="{FF2B5EF4-FFF2-40B4-BE49-F238E27FC236}">
+                  <a16:creationId xmlns:a16="http://schemas.microsoft.com/office/drawing/2014/main" id="{6DF22524-90FB-4367-AE77-B3A88BF5FE6C}"/>
+                </a:ext>
+              </a:extLst>
+            </p:cNvPr>
+            <p:cNvCxnSpPr>
+              <a:cxnSpLocks/>
+            </p:cNvCxnSpPr>
+            <p:nvPr/>
+          </p:nvCxnSpPr>
+          <p:spPr>
+            <a:xfrm>
+              <a:off x="2160913" y="1619116"/>
+              <a:ext cx="0" cy="3610030"/>
+            </a:xfrm>
+            <a:prstGeom prst="line">
+              <a:avLst/>
+            </a:prstGeom>
+          </p:spPr>
+          <p:style>
+            <a:lnRef idx="1">
+              <a:schemeClr val="accent1"/>
+            </a:lnRef>
+            <a:fillRef idx="0">
+              <a:schemeClr val="accent1"/>
+            </a:fillRef>
+            <a:effectRef idx="0">
+              <a:schemeClr val="accent1"/>
+            </a:effectRef>
+            <a:fontRef idx="minor">
+              <a:schemeClr val="tx1"/>
+            </a:fontRef>
+          </p:style>
+        </p:cxnSp>
+      </p:grpSp>
+      <p:pic>
+        <p:nvPicPr>
+          <p:cNvPr id="4" name="Picture 3">
+            <a:extLst>
+              <a:ext uri="{FF2B5EF4-FFF2-40B4-BE49-F238E27FC236}">
+                <a16:creationId xmlns:a16="http://schemas.microsoft.com/office/drawing/2014/main" id="{0374D0BE-FDE2-4B29-A3F5-76EC1F4D90BB}"/>
+              </a:ext>
+            </a:extLst>
+          </p:cNvPr>
+          <p:cNvPicPr>
+            <a:picLocks noChangeAspect="1"/>
+          </p:cNvPicPr>
+          <p:nvPr/>
+        </p:nvPicPr>
+        <p:blipFill>
+          <a:blip r:embed="rId3">
+            <a:extLst>
+              <a:ext uri="{28A0092B-C50C-407E-A947-70E740481C1C}">
+                <a14:useLocalDpi xmlns:a14="http://schemas.microsoft.com/office/drawing/2010/main" val="0"/>
+              </a:ext>
+            </a:extLst>
+          </a:blip>
+          <a:stretch>
+            <a:fillRect/>
+          </a:stretch>
+        </p:blipFill>
+        <p:spPr>
+          <a:xfrm>
+            <a:off x="762000" y="1428750"/>
+            <a:ext cx="7620000" cy="4000500"/>
+          </a:xfrm>
+          <a:prstGeom prst="rect">
+            <a:avLst/>
+          </a:prstGeom>
+        </p:spPr>
+      </p:pic>
+      <p:pic>
+        <p:nvPicPr>
+          <p:cNvPr id="7" name="Picture 6">
+            <a:extLst>
+              <a:ext uri="{FF2B5EF4-FFF2-40B4-BE49-F238E27FC236}">
+                <a16:creationId xmlns:a16="http://schemas.microsoft.com/office/drawing/2014/main" id="{FA33E779-2D7D-4976-8055-71E9F96A4B13}"/>
+              </a:ext>
+            </a:extLst>
+          </p:cNvPr>
+          <p:cNvPicPr>
+            <a:picLocks noChangeAspect="1"/>
+          </p:cNvPicPr>
+          <p:nvPr/>
+        </p:nvPicPr>
+        <p:blipFill>
+          <a:blip r:embed="rId4">
+            <a:extLst>
+              <a:ext uri="{28A0092B-C50C-407E-A947-70E740481C1C}">
+                <a14:useLocalDpi xmlns:a14="http://schemas.microsoft.com/office/drawing/2010/main" val="0"/>
+              </a:ext>
+            </a:extLst>
+          </a:blip>
+          <a:stretch>
+            <a:fillRect/>
+          </a:stretch>
+        </p:blipFill>
+        <p:spPr>
+          <a:xfrm>
+            <a:off x="762000" y="1428750"/>
+            <a:ext cx="7620000" cy="4000500"/>
+          </a:xfrm>
+          <a:prstGeom prst="rect">
+            <a:avLst/>
+          </a:prstGeom>
+        </p:spPr>
+      </p:pic>
+    </p:spTree>
+    <p:extLst>
+      <p:ext uri="{BB962C8B-B14F-4D97-AF65-F5344CB8AC3E}">
+        <p14:creationId xmlns:p14="http://schemas.microsoft.com/office/powerpoint/2010/main" val="1130063064"/>
+      </p:ext>
+    </p:extLst>
+  </p:cSld>
+  <p:clrMapOvr>
+    <a:masterClrMapping/>
+  </p:clrMapOvr>
+</p:sld>
+</file>
+
 <file path=ppt/theme/theme1.xml><?xml version="1.0" encoding="utf-8"?>
 <a:theme xmlns:a="http://schemas.openxmlformats.org/drawingml/2006/main" name="DefaultTheme2020">
   <a:themeElements>

</xml_diff>

<commit_message>
minor updates to shuffleboard
</commit_message>
<xml_diff>
--- a/misc/2021_grids.pptx
+++ b/misc/2021_grids.pptx
@@ -9,6 +9,7 @@
     <p:sldId id="257" r:id="rId3"/>
     <p:sldId id="258" r:id="rId4"/>
     <p:sldId id="259" r:id="rId5"/>
+    <p:sldId id="260" r:id="rId6"/>
   </p:sldIdLst>
   <p:sldSz cx="9144000" cy="6858000" type="screen4x3"/>
   <p:notesSz cx="6858000" cy="9144000"/>
@@ -246,7 +247,7 @@
           <a:p>
             <a:fld id="{FB18013C-0488-41A0-AC40-02F47DCD4E43}" type="datetimeFigureOut">
               <a:rPr lang="en-US" smtClean="0"/>
-              <a:t>2/7/2021</a:t>
+              <a:t>2/22/2021</a:t>
             </a:fld>
             <a:endParaRPr lang="en-US"/>
           </a:p>
@@ -416,7 +417,7 @@
           <a:p>
             <a:fld id="{FB18013C-0488-41A0-AC40-02F47DCD4E43}" type="datetimeFigureOut">
               <a:rPr lang="en-US" smtClean="0"/>
-              <a:t>2/7/2021</a:t>
+              <a:t>2/22/2021</a:t>
             </a:fld>
             <a:endParaRPr lang="en-US"/>
           </a:p>
@@ -596,7 +597,7 @@
           <a:p>
             <a:fld id="{FB18013C-0488-41A0-AC40-02F47DCD4E43}" type="datetimeFigureOut">
               <a:rPr lang="en-US" smtClean="0"/>
-              <a:t>2/7/2021</a:t>
+              <a:t>2/22/2021</a:t>
             </a:fld>
             <a:endParaRPr lang="en-US"/>
           </a:p>
@@ -766,7 +767,7 @@
           <a:p>
             <a:fld id="{FB18013C-0488-41A0-AC40-02F47DCD4E43}" type="datetimeFigureOut">
               <a:rPr lang="en-US" smtClean="0"/>
-              <a:t>2/7/2021</a:t>
+              <a:t>2/22/2021</a:t>
             </a:fld>
             <a:endParaRPr lang="en-US"/>
           </a:p>
@@ -1010,7 +1011,7 @@
           <a:p>
             <a:fld id="{FB18013C-0488-41A0-AC40-02F47DCD4E43}" type="datetimeFigureOut">
               <a:rPr lang="en-US" smtClean="0"/>
-              <a:t>2/7/2021</a:t>
+              <a:t>2/22/2021</a:t>
             </a:fld>
             <a:endParaRPr lang="en-US"/>
           </a:p>
@@ -1242,7 +1243,7 @@
           <a:p>
             <a:fld id="{FB18013C-0488-41A0-AC40-02F47DCD4E43}" type="datetimeFigureOut">
               <a:rPr lang="en-US" smtClean="0"/>
-              <a:t>2/7/2021</a:t>
+              <a:t>2/22/2021</a:t>
             </a:fld>
             <a:endParaRPr lang="en-US"/>
           </a:p>
@@ -1609,7 +1610,7 @@
           <a:p>
             <a:fld id="{FB18013C-0488-41A0-AC40-02F47DCD4E43}" type="datetimeFigureOut">
               <a:rPr lang="en-US" smtClean="0"/>
-              <a:t>2/7/2021</a:t>
+              <a:t>2/22/2021</a:t>
             </a:fld>
             <a:endParaRPr lang="en-US"/>
           </a:p>
@@ -1727,7 +1728,7 @@
           <a:p>
             <a:fld id="{FB18013C-0488-41A0-AC40-02F47DCD4E43}" type="datetimeFigureOut">
               <a:rPr lang="en-US" smtClean="0"/>
-              <a:t>2/7/2021</a:t>
+              <a:t>2/22/2021</a:t>
             </a:fld>
             <a:endParaRPr lang="en-US"/>
           </a:p>
@@ -1822,7 +1823,7 @@
           <a:p>
             <a:fld id="{FB18013C-0488-41A0-AC40-02F47DCD4E43}" type="datetimeFigureOut">
               <a:rPr lang="en-US" smtClean="0"/>
-              <a:t>2/7/2021</a:t>
+              <a:t>2/22/2021</a:t>
             </a:fld>
             <a:endParaRPr lang="en-US"/>
           </a:p>
@@ -2099,7 +2100,7 @@
           <a:p>
             <a:fld id="{FB18013C-0488-41A0-AC40-02F47DCD4E43}" type="datetimeFigureOut">
               <a:rPr lang="en-US" smtClean="0"/>
-              <a:t>2/7/2021</a:t>
+              <a:t>2/22/2021</a:t>
             </a:fld>
             <a:endParaRPr lang="en-US"/>
           </a:p>
@@ -2356,7 +2357,7 @@
           <a:p>
             <a:fld id="{FB18013C-0488-41A0-AC40-02F47DCD4E43}" type="datetimeFigureOut">
               <a:rPr lang="en-US" smtClean="0"/>
-              <a:t>2/7/2021</a:t>
+              <a:t>2/22/2021</a:t>
             </a:fld>
             <a:endParaRPr lang="en-US"/>
           </a:p>
@@ -2569,7 +2570,7 @@
           <a:p>
             <a:fld id="{FB18013C-0488-41A0-AC40-02F47DCD4E43}" type="datetimeFigureOut">
               <a:rPr lang="en-US" smtClean="0"/>
-              <a:t>2/7/2021</a:t>
+              <a:t>2/22/2021</a:t>
             </a:fld>
             <a:endParaRPr lang="en-US"/>
           </a:p>
@@ -4857,6 +4858,264 @@
 </p:sld>
 </file>
 
+<file path=ppt/slides/slide5.xml><?xml version="1.0" encoding="utf-8"?>
+<p:sld xmlns:a="http://schemas.openxmlformats.org/drawingml/2006/main" xmlns:r="http://schemas.openxmlformats.org/officeDocument/2006/relationships" xmlns:p="http://schemas.openxmlformats.org/presentationml/2006/main">
+  <p:cSld>
+    <p:spTree>
+      <p:nvGrpSpPr>
+        <p:cNvPr id="1" name=""/>
+        <p:cNvGrpSpPr/>
+        <p:nvPr/>
+      </p:nvGrpSpPr>
+      <p:grpSpPr>
+        <a:xfrm>
+          <a:off x="0" y="0"/>
+          <a:ext cx="0" cy="0"/>
+          <a:chOff x="0" y="0"/>
+          <a:chExt cx="0" cy="0"/>
+        </a:xfrm>
+      </p:grpSpPr>
+      <p:pic>
+        <p:nvPicPr>
+          <p:cNvPr id="4" name="Picture 3">
+            <a:extLst>
+              <a:ext uri="{FF2B5EF4-FFF2-40B4-BE49-F238E27FC236}">
+                <a16:creationId xmlns:a16="http://schemas.microsoft.com/office/drawing/2014/main" id="{7C18607A-594E-473D-B8AB-A01FCEA13007}"/>
+              </a:ext>
+            </a:extLst>
+          </p:cNvPr>
+          <p:cNvPicPr>
+            <a:picLocks noChangeAspect="1"/>
+          </p:cNvPicPr>
+          <p:nvPr/>
+        </p:nvPicPr>
+        <p:blipFill>
+          <a:blip r:embed="rId2"/>
+          <a:stretch>
+            <a:fillRect/>
+          </a:stretch>
+        </p:blipFill>
+        <p:spPr>
+          <a:xfrm>
+            <a:off x="0" y="519545"/>
+            <a:ext cx="9144000" cy="5818909"/>
+          </a:xfrm>
+          <a:prstGeom prst="rect">
+            <a:avLst/>
+          </a:prstGeom>
+        </p:spPr>
+      </p:pic>
+      <p:sp>
+        <p:nvSpPr>
+          <p:cNvPr id="5" name="Oval 4">
+            <a:extLst>
+              <a:ext uri="{FF2B5EF4-FFF2-40B4-BE49-F238E27FC236}">
+                <a16:creationId xmlns:a16="http://schemas.microsoft.com/office/drawing/2014/main" id="{8E418F57-7DC3-488D-A4E5-B7E255A17BFC}"/>
+              </a:ext>
+            </a:extLst>
+          </p:cNvPr>
+          <p:cNvSpPr/>
+          <p:nvPr/>
+        </p:nvSpPr>
+        <p:spPr>
+          <a:xfrm>
+            <a:off x="1024467" y="1126067"/>
+            <a:ext cx="1794933" cy="186266"/>
+          </a:xfrm>
+          <a:prstGeom prst="ellipse">
+            <a:avLst/>
+          </a:prstGeom>
+          <a:noFill/>
+          <a:ln>
+            <a:solidFill>
+              <a:srgbClr val="FF0000"/>
+            </a:solidFill>
+          </a:ln>
+        </p:spPr>
+        <p:style>
+          <a:lnRef idx="2">
+            <a:schemeClr val="accent1">
+              <a:shade val="50000"/>
+            </a:schemeClr>
+          </a:lnRef>
+          <a:fillRef idx="1">
+            <a:schemeClr val="accent1"/>
+          </a:fillRef>
+          <a:effectRef idx="0">
+            <a:schemeClr val="accent1"/>
+          </a:effectRef>
+          <a:fontRef idx="minor">
+            <a:schemeClr val="lt1"/>
+          </a:fontRef>
+        </p:style>
+        <p:txBody>
+          <a:bodyPr rtlCol="0" anchor="ctr"/>
+          <a:lstStyle/>
+          <a:p>
+            <a:pPr algn="ctr"/>
+            <a:endParaRPr lang="en-US"/>
+          </a:p>
+        </p:txBody>
+      </p:sp>
+      <p:cxnSp>
+        <p:nvCxnSpPr>
+          <p:cNvPr id="7" name="Straight Arrow Connector 6">
+            <a:extLst>
+              <a:ext uri="{FF2B5EF4-FFF2-40B4-BE49-F238E27FC236}">
+                <a16:creationId xmlns:a16="http://schemas.microsoft.com/office/drawing/2014/main" id="{8C443191-2A6C-4CF7-AD6D-710EC8DDE89B}"/>
+              </a:ext>
+            </a:extLst>
+          </p:cNvPr>
+          <p:cNvCxnSpPr/>
+          <p:nvPr/>
+        </p:nvCxnSpPr>
+        <p:spPr>
+          <a:xfrm>
+            <a:off x="2819400" y="1312333"/>
+            <a:ext cx="939800" cy="1041400"/>
+          </a:xfrm>
+          <a:prstGeom prst="straightConnector1">
+            <a:avLst/>
+          </a:prstGeom>
+          <a:ln w="28575">
+            <a:solidFill>
+              <a:srgbClr val="FF0000"/>
+            </a:solidFill>
+            <a:tailEnd type="triangle"/>
+          </a:ln>
+        </p:spPr>
+        <p:style>
+          <a:lnRef idx="1">
+            <a:schemeClr val="accent1"/>
+          </a:lnRef>
+          <a:fillRef idx="0">
+            <a:schemeClr val="accent1"/>
+          </a:fillRef>
+          <a:effectRef idx="0">
+            <a:schemeClr val="accent1"/>
+          </a:effectRef>
+          <a:fontRef idx="minor">
+            <a:schemeClr val="tx1"/>
+          </a:fontRef>
+        </p:style>
+      </p:cxnSp>
+      <p:sp>
+        <p:nvSpPr>
+          <p:cNvPr id="8" name="Oval 7">
+            <a:extLst>
+              <a:ext uri="{FF2B5EF4-FFF2-40B4-BE49-F238E27FC236}">
+                <a16:creationId xmlns:a16="http://schemas.microsoft.com/office/drawing/2014/main" id="{C441BCE2-3B7F-47A0-9C31-E9BF4A4249B4}"/>
+              </a:ext>
+            </a:extLst>
+          </p:cNvPr>
+          <p:cNvSpPr/>
+          <p:nvPr/>
+        </p:nvSpPr>
+        <p:spPr>
+          <a:xfrm>
+            <a:off x="3674533" y="2370666"/>
+            <a:ext cx="1794933" cy="186266"/>
+          </a:xfrm>
+          <a:prstGeom prst="ellipse">
+            <a:avLst/>
+          </a:prstGeom>
+          <a:noFill/>
+          <a:ln>
+            <a:solidFill>
+              <a:srgbClr val="FF0000"/>
+            </a:solidFill>
+          </a:ln>
+        </p:spPr>
+        <p:style>
+          <a:lnRef idx="2">
+            <a:schemeClr val="accent1">
+              <a:shade val="50000"/>
+            </a:schemeClr>
+          </a:lnRef>
+          <a:fillRef idx="1">
+            <a:schemeClr val="accent1"/>
+          </a:fillRef>
+          <a:effectRef idx="0">
+            <a:schemeClr val="accent1"/>
+          </a:effectRef>
+          <a:fontRef idx="minor">
+            <a:schemeClr val="lt1"/>
+          </a:fontRef>
+        </p:style>
+        <p:txBody>
+          <a:bodyPr rtlCol="0" anchor="ctr"/>
+          <a:lstStyle/>
+          <a:p>
+            <a:pPr algn="ctr"/>
+            <a:endParaRPr lang="en-US"/>
+          </a:p>
+        </p:txBody>
+      </p:sp>
+      <p:sp>
+        <p:nvSpPr>
+          <p:cNvPr id="9" name="Oval 8">
+            <a:extLst>
+              <a:ext uri="{FF2B5EF4-FFF2-40B4-BE49-F238E27FC236}">
+                <a16:creationId xmlns:a16="http://schemas.microsoft.com/office/drawing/2014/main" id="{030F7B10-04BE-45F5-A447-15A26C6A0CE8}"/>
+              </a:ext>
+            </a:extLst>
+          </p:cNvPr>
+          <p:cNvSpPr/>
+          <p:nvPr/>
+        </p:nvSpPr>
+        <p:spPr>
+          <a:xfrm>
+            <a:off x="846668" y="755074"/>
+            <a:ext cx="931334" cy="186266"/>
+          </a:xfrm>
+          <a:prstGeom prst="ellipse">
+            <a:avLst/>
+          </a:prstGeom>
+          <a:noFill/>
+          <a:ln>
+            <a:solidFill>
+              <a:srgbClr val="FF0000"/>
+            </a:solidFill>
+          </a:ln>
+        </p:spPr>
+        <p:style>
+          <a:lnRef idx="2">
+            <a:schemeClr val="accent1">
+              <a:shade val="50000"/>
+            </a:schemeClr>
+          </a:lnRef>
+          <a:fillRef idx="1">
+            <a:schemeClr val="accent1"/>
+          </a:fillRef>
+          <a:effectRef idx="0">
+            <a:schemeClr val="accent1"/>
+          </a:effectRef>
+          <a:fontRef idx="minor">
+            <a:schemeClr val="lt1"/>
+          </a:fontRef>
+        </p:style>
+        <p:txBody>
+          <a:bodyPr rtlCol="0" anchor="ctr"/>
+          <a:lstStyle/>
+          <a:p>
+            <a:pPr algn="ctr"/>
+            <a:endParaRPr lang="en-US"/>
+          </a:p>
+        </p:txBody>
+      </p:sp>
+    </p:spTree>
+    <p:extLst>
+      <p:ext uri="{BB962C8B-B14F-4D97-AF65-F5344CB8AC3E}">
+        <p14:creationId xmlns:p14="http://schemas.microsoft.com/office/powerpoint/2010/main" val="2799690332"/>
+      </p:ext>
+    </p:extLst>
+  </p:cSld>
+  <p:clrMapOvr>
+    <a:masterClrMapping/>
+  </p:clrMapOvr>
+</p:sld>
+</file>
+
 <file path=ppt/theme/theme1.xml><?xml version="1.0" encoding="utf-8"?>
 <a:theme xmlns:a="http://schemas.openxmlformats.org/drawingml/2006/main" name="DefaultTheme2020">
   <a:themeElements>

</xml_diff>